<commit_message>
api routes added with changes to the page order
</commit_message>
<xml_diff>
--- a/RESTAURANT PoS.pptx
+++ b/RESTAURANT PoS.pptx
@@ -11,8 +11,9 @@
     <p:sldId id="259" r:id="rId5"/>
     <p:sldId id="261" r:id="rId6"/>
     <p:sldId id="262" r:id="rId7"/>
-    <p:sldId id="264" r:id="rId8"/>
-    <p:sldId id="260" r:id="rId9"/>
+    <p:sldId id="265" r:id="rId8"/>
+    <p:sldId id="264" r:id="rId9"/>
+    <p:sldId id="260" r:id="rId10"/>
   </p:sldIdLst>
   <p:sldSz cx="12192000" cy="6858000"/>
   <p:notesSz cx="6858000" cy="9144000"/>
@@ -111,6 +112,11 @@
       </a:defRPr>
     </a:lvl9pPr>
   </p:defaultTextStyle>
+  <p:extLst>
+    <p:ext uri="{EFAFB233-063F-42B5-8137-9DF3F51BA10A}">
+      <p15:sldGuideLst xmlns:p15="http://schemas.microsoft.com/office/powerpoint/2012/main"/>
+    </p:ext>
+  </p:extLst>
 </p:presentation>
 </file>
 
@@ -517,7 +523,7 @@
           <a:p>
             <a:fld id="{5D551A6D-4127-4EC1-9948-392C3275DE62}" type="datetimeFigureOut">
               <a:rPr lang="en-US" smtClean="0"/>
-              <a:t>16-Jan-18</a:t>
+              <a:t>17-Jan-18</a:t>
             </a:fld>
             <a:endParaRPr lang="en-US"/>
           </a:p>
@@ -696,7 +702,7 @@
           <a:p>
             <a:fld id="{5D551A6D-4127-4EC1-9948-392C3275DE62}" type="datetimeFigureOut">
               <a:rPr lang="en-US" smtClean="0"/>
-              <a:t>16-Jan-18</a:t>
+              <a:t>17-Jan-18</a:t>
             </a:fld>
             <a:endParaRPr lang="en-US"/>
           </a:p>
@@ -876,7 +882,7 @@
           <a:p>
             <a:fld id="{5D551A6D-4127-4EC1-9948-392C3275DE62}" type="datetimeFigureOut">
               <a:rPr lang="en-US" smtClean="0"/>
-              <a:t>16-Jan-18</a:t>
+              <a:t>17-Jan-18</a:t>
             </a:fld>
             <a:endParaRPr lang="en-US"/>
           </a:p>
@@ -1046,7 +1052,7 @@
           <a:p>
             <a:fld id="{5D551A6D-4127-4EC1-9948-392C3275DE62}" type="datetimeFigureOut">
               <a:rPr lang="en-US" smtClean="0"/>
-              <a:t>16-Jan-18</a:t>
+              <a:t>17-Jan-18</a:t>
             </a:fld>
             <a:endParaRPr lang="en-US"/>
           </a:p>
@@ -1359,7 +1365,7 @@
           <a:p>
             <a:fld id="{5D551A6D-4127-4EC1-9948-392C3275DE62}" type="datetimeFigureOut">
               <a:rPr lang="en-US" smtClean="0"/>
-              <a:t>16-Jan-18</a:t>
+              <a:t>17-Jan-18</a:t>
             </a:fld>
             <a:endParaRPr lang="en-US"/>
           </a:p>
@@ -1745,7 +1751,7 @@
           <a:p>
             <a:fld id="{5D551A6D-4127-4EC1-9948-392C3275DE62}" type="datetimeFigureOut">
               <a:rPr lang="en-US" smtClean="0"/>
-              <a:t>16-Jan-18</a:t>
+              <a:t>17-Jan-18</a:t>
             </a:fld>
             <a:endParaRPr lang="en-US"/>
           </a:p>
@@ -2179,7 +2185,7 @@
           <a:p>
             <a:fld id="{5D551A6D-4127-4EC1-9948-392C3275DE62}" type="datetimeFigureOut">
               <a:rPr lang="en-US" smtClean="0"/>
-              <a:t>16-Jan-18</a:t>
+              <a:t>17-Jan-18</a:t>
             </a:fld>
             <a:endParaRPr lang="en-US"/>
           </a:p>
@@ -2297,7 +2303,7 @@
           <a:p>
             <a:fld id="{5D551A6D-4127-4EC1-9948-392C3275DE62}" type="datetimeFigureOut">
               <a:rPr lang="en-US" smtClean="0"/>
-              <a:t>16-Jan-18</a:t>
+              <a:t>17-Jan-18</a:t>
             </a:fld>
             <a:endParaRPr lang="en-US"/>
           </a:p>
@@ -2392,7 +2398,7 @@
           <a:p>
             <a:fld id="{5D551A6D-4127-4EC1-9948-392C3275DE62}" type="datetimeFigureOut">
               <a:rPr lang="en-US" smtClean="0"/>
-              <a:t>16-Jan-18</a:t>
+              <a:t>17-Jan-18</a:t>
             </a:fld>
             <a:endParaRPr lang="en-US"/>
           </a:p>
@@ -2742,7 +2748,7 @@
           <a:p>
             <a:fld id="{5D551A6D-4127-4EC1-9948-392C3275DE62}" type="datetimeFigureOut">
               <a:rPr lang="en-US" smtClean="0"/>
-              <a:t>16-Jan-18</a:t>
+              <a:t>17-Jan-18</a:t>
             </a:fld>
             <a:endParaRPr lang="en-US"/>
           </a:p>
@@ -3167,7 +3173,7 @@
           <a:p>
             <a:fld id="{5D551A6D-4127-4EC1-9948-392C3275DE62}" type="datetimeFigureOut">
               <a:rPr lang="en-US" smtClean="0"/>
-              <a:t>16-Jan-18</a:t>
+              <a:t>17-Jan-18</a:t>
             </a:fld>
             <a:endParaRPr lang="en-US"/>
           </a:p>
@@ -3448,7 +3454,7 @@
           <a:p>
             <a:fld id="{5D551A6D-4127-4EC1-9948-392C3275DE62}" type="datetimeFigureOut">
               <a:rPr lang="en-US" smtClean="0"/>
-              <a:t>16-Jan-18</a:t>
+              <a:t>17-Jan-18</a:t>
             </a:fld>
             <a:endParaRPr lang="en-US"/>
           </a:p>
@@ -4045,7 +4051,15 @@
             </a:r>
             <a:r>
               <a:rPr lang="en-US" b="1" dirty="0" err="1" smtClean="0"/>
-              <a:t>PoS</a:t>
+              <a:t>P</a:t>
+            </a:r>
+            <a:r>
+              <a:rPr lang="en-US" b="1" cap="none" dirty="0" err="1" smtClean="0"/>
+              <a:t>o</a:t>
+            </a:r>
+            <a:r>
+              <a:rPr lang="en-US" b="1" dirty="0" err="1" smtClean="0"/>
+              <a:t>S</a:t>
             </a:r>
             <a:endParaRPr lang="en-US" b="1" dirty="0"/>
           </a:p>
@@ -4161,7 +4175,15 @@
             </a:r>
             <a:r>
               <a:rPr lang="en-US" b="1" dirty="0" err="1" smtClean="0"/>
-              <a:t>PoS</a:t>
+              <a:t>P</a:t>
+            </a:r>
+            <a:r>
+              <a:rPr lang="en-US" b="1" cap="none" dirty="0" err="1" smtClean="0"/>
+              <a:t>o</a:t>
+            </a:r>
+            <a:r>
+              <a:rPr lang="en-US" b="1" dirty="0" err="1" smtClean="0"/>
+              <a:t>S</a:t>
             </a:r>
             <a:r>
               <a:rPr lang="en-US" b="1" dirty="0" smtClean="0"/>
@@ -4316,7 +4338,15 @@
             </a:r>
             <a:r>
               <a:rPr lang="en-US" b="1" dirty="0" err="1" smtClean="0"/>
-              <a:t>PoS</a:t>
+              <a:t>P</a:t>
+            </a:r>
+            <a:r>
+              <a:rPr lang="en-US" b="1" cap="none" dirty="0" err="1" smtClean="0"/>
+              <a:t>o</a:t>
+            </a:r>
+            <a:r>
+              <a:rPr lang="en-US" b="1" dirty="0" err="1" smtClean="0"/>
+              <a:t>S</a:t>
             </a:r>
             <a:r>
               <a:rPr lang="en-US" b="1" dirty="0" smtClean="0"/>
@@ -4324,7 +4354,15 @@
             </a:r>
             <a:r>
               <a:rPr lang="en-US" b="1" dirty="0" err="1" smtClean="0"/>
-              <a:t>PoS.</a:t>
+              <a:t>P</a:t>
+            </a:r>
+            <a:r>
+              <a:rPr lang="en-US" b="1" cap="none" dirty="0" err="1" smtClean="0"/>
+              <a:t>o</a:t>
+            </a:r>
+            <a:r>
+              <a:rPr lang="en-US" b="1" dirty="0" err="1" smtClean="0"/>
+              <a:t>S.</a:t>
             </a:r>
             <a:endParaRPr lang="en-US" b="1" dirty="0"/>
           </a:p>
@@ -4348,71 +4386,71 @@
           <a:lstStyle/>
           <a:p>
             <a:r>
-              <a:rPr lang="en-US" dirty="0"/>
+              <a:rPr lang="en-US" sz="2800" dirty="0"/>
               <a:t>Getting tied up in long-term (and inflexible) </a:t>
             </a:r>
             <a:r>
-              <a:rPr lang="en-US" dirty="0" smtClean="0"/>
+              <a:rPr lang="en-US" sz="2800" dirty="0" smtClean="0"/>
               <a:t>contracts?</a:t>
             </a:r>
           </a:p>
           <a:p>
             <a:pPr lvl="1"/>
             <a:r>
-              <a:rPr lang="en-US" dirty="0" smtClean="0"/>
+              <a:rPr lang="en-US" sz="2400" dirty="0" smtClean="0"/>
               <a:t>If </a:t>
             </a:r>
             <a:r>
-              <a:rPr lang="en-US" dirty="0"/>
+              <a:rPr lang="en-US" sz="2400" dirty="0"/>
               <a:t>you discover </a:t>
             </a:r>
             <a:r>
-              <a:rPr lang="en-US" dirty="0" smtClean="0"/>
+              <a:rPr lang="en-US" sz="2400" dirty="0" smtClean="0"/>
               <a:t>your old </a:t>
             </a:r>
             <a:r>
-              <a:rPr lang="en-US" dirty="0" err="1" smtClean="0"/>
+              <a:rPr lang="en-US" sz="2400" dirty="0" err="1" smtClean="0"/>
               <a:t>PoS</a:t>
             </a:r>
             <a:r>
-              <a:rPr lang="en-US" dirty="0" smtClean="0"/>
+              <a:rPr lang="en-US" sz="2400" dirty="0" smtClean="0"/>
               <a:t> is </a:t>
             </a:r>
             <a:r>
-              <a:rPr lang="en-US" dirty="0"/>
+              <a:rPr lang="en-US" sz="2400" dirty="0"/>
               <a:t>not the best fit for your business, you can always switch with minimal </a:t>
             </a:r>
             <a:r>
-              <a:rPr lang="en-US" dirty="0" smtClean="0"/>
+              <a:rPr lang="en-US" sz="2400" dirty="0" smtClean="0"/>
               <a:t>hassle.</a:t>
             </a:r>
           </a:p>
           <a:p>
             <a:pPr lvl="1"/>
-            <a:endParaRPr lang="en-US" dirty="0" smtClean="0"/>
+            <a:endParaRPr lang="en-US" sz="2400" dirty="0" smtClean="0"/>
           </a:p>
           <a:p>
             <a:pPr lvl="1"/>
-            <a:endParaRPr lang="en-US" dirty="0" smtClean="0"/>
-          </a:p>
-          <a:p>
-            <a:r>
-              <a:rPr lang="en-US" dirty="0" smtClean="0"/>
+            <a:endParaRPr lang="en-US" sz="2400" dirty="0" smtClean="0"/>
+          </a:p>
+          <a:p>
+            <a:r>
+              <a:rPr lang="en-US" sz="2800" dirty="0" smtClean="0"/>
               <a:t>Not </a:t>
             </a:r>
             <a:r>
-              <a:rPr lang="en-US" dirty="0"/>
+              <a:rPr lang="en-US" sz="2800" dirty="0"/>
               <a:t>having a migration plan in </a:t>
             </a:r>
             <a:r>
-              <a:rPr lang="en-US" dirty="0" smtClean="0"/>
+              <a:rPr lang="en-US" sz="2800" dirty="0" smtClean="0"/>
               <a:t>place?</a:t>
             </a:r>
           </a:p>
           <a:p>
             <a:pPr lvl="1"/>
             <a:r>
-              <a:rPr lang="en-US" dirty="0" smtClean="0"/>
+              <a:rPr lang="en-US" sz="2400" dirty="0" smtClean="0"/>
               <a:t>Works seamlessly on various database types so migration is easy</a:t>
             </a:r>
           </a:p>
@@ -4476,7 +4514,15 @@
             </a:r>
             <a:r>
               <a:rPr lang="en-US" b="1" dirty="0" err="1" smtClean="0"/>
-              <a:t>PoS</a:t>
+              <a:t>P</a:t>
+            </a:r>
+            <a:r>
+              <a:rPr lang="en-US" b="1" cap="none" dirty="0" err="1" smtClean="0"/>
+              <a:t>o</a:t>
+            </a:r>
+            <a:r>
+              <a:rPr lang="en-US" b="1" dirty="0" err="1" smtClean="0"/>
+              <a:t>S</a:t>
             </a:r>
             <a:r>
               <a:rPr lang="en-US" b="1" dirty="0" smtClean="0"/>
@@ -4506,32 +4552,33 @@
         </p:nvSpPr>
         <p:spPr/>
         <p:txBody>
-          <a:bodyPr/>
+          <a:bodyPr>
+            <a:normAutofit/>
+          </a:bodyPr>
           <a:lstStyle/>
           <a:p>
             <a:r>
-              <a:rPr lang="en-US" dirty="0" smtClean="0"/>
+              <a:rPr lang="en-US" sz="2800" dirty="0" smtClean="0"/>
               <a:t>Flexible and lightweight so you can run it on systems with super low memory.</a:t>
             </a:r>
           </a:p>
           <a:p>
-            <a:endParaRPr lang="en-US" dirty="0" smtClean="0"/>
-          </a:p>
-          <a:p>
-            <a:r>
-              <a:rPr lang="en-US" dirty="0" smtClean="0"/>
+            <a:endParaRPr lang="en-US" sz="2800" dirty="0" smtClean="0"/>
+          </a:p>
+          <a:p>
+            <a:r>
+              <a:rPr lang="en-US" sz="2800" dirty="0" smtClean="0"/>
               <a:t>Compatible with many browsers of all screen sizes.</a:t>
             </a:r>
           </a:p>
           <a:p>
-            <a:endParaRPr lang="en-US" dirty="0" smtClean="0"/>
-          </a:p>
-          <a:p>
-            <a:r>
-              <a:rPr lang="en-US" dirty="0" smtClean="0"/>
+            <a:endParaRPr lang="en-US" sz="2800" dirty="0" smtClean="0"/>
+          </a:p>
+          <a:p>
+            <a:r>
+              <a:rPr lang="en-US" sz="2800" dirty="0" smtClean="0"/>
               <a:t>We allow customization to allow easy</a:t>
             </a:r>
-            <a:endParaRPr lang="en-US" dirty="0" smtClean="0"/>
           </a:p>
         </p:txBody>
       </p:sp>
@@ -4595,25 +4642,47 @@
           </a:p>
         </p:txBody>
       </p:sp>
-      <p:sp>
-        <p:nvSpPr>
-          <p:cNvPr id="3" name="Content Placeholder 2"/>
-          <p:cNvSpPr>
-            <a:spLocks noGrp="1"/>
-          </p:cNvSpPr>
+      <p:pic>
+        <p:nvPicPr>
+          <p:cNvPr id="4" name="Content Placeholder 3"/>
+          <p:cNvPicPr>
+            <a:picLocks noGrp="1" noChangeAspect="1"/>
+          </p:cNvPicPr>
           <p:nvPr>
             <p:ph idx="1"/>
           </p:nvPr>
-        </p:nvSpPr>
-        <p:spPr/>
-        <p:txBody>
-          <a:bodyPr/>
-          <a:lstStyle/>
-          <a:p>
-            <a:endParaRPr lang="en-US"/>
-          </a:p>
-        </p:txBody>
-      </p:sp>
+        </p:nvPicPr>
+        <p:blipFill rotWithShape="1">
+          <a:blip r:embed="rId2" cstate="print">
+            <a:extLst>
+              <a:ext uri="{28A0092B-C50C-407E-A947-70E740481C1C}">
+                <a14:useLocalDpi xmlns:a14="http://schemas.microsoft.com/office/drawing/2010/main" val="0"/>
+              </a:ext>
+            </a:extLst>
+          </a:blip>
+          <a:srcRect r="1377"/>
+          <a:stretch/>
+        </p:blipFill>
+        <p:spPr>
+          <a:xfrm>
+            <a:off x="2498019" y="2120900"/>
+            <a:ext cx="7103181" cy="4051300"/>
+          </a:xfrm>
+          <a:prstGeom prst="rect">
+            <a:avLst/>
+          </a:prstGeom>
+          <a:ln>
+            <a:noFill/>
+          </a:ln>
+          <a:effectLst>
+            <a:outerShdw blurRad="292100" dist="139700" dir="2700000" algn="tl" rotWithShape="0">
+              <a:srgbClr val="333333">
+                <a:alpha val="65000"/>
+              </a:srgbClr>
+            </a:outerShdw>
+          </a:effectLst>
+        </p:spPr>
+      </p:pic>
     </p:spTree>
     <p:extLst>
       <p:ext uri="{BB962C8B-B14F-4D97-AF65-F5344CB8AC3E}">
@@ -4674,25 +4743,47 @@
           </a:p>
         </p:txBody>
       </p:sp>
-      <p:sp>
-        <p:nvSpPr>
-          <p:cNvPr id="3" name="Content Placeholder 2"/>
-          <p:cNvSpPr>
-            <a:spLocks noGrp="1"/>
-          </p:cNvSpPr>
+      <p:pic>
+        <p:nvPicPr>
+          <p:cNvPr id="4" name="Content Placeholder 3"/>
+          <p:cNvPicPr>
+            <a:picLocks noGrp="1" noChangeAspect="1"/>
+          </p:cNvPicPr>
           <p:nvPr>
             <p:ph idx="1"/>
           </p:nvPr>
-        </p:nvSpPr>
-        <p:spPr/>
-        <p:txBody>
-          <a:bodyPr/>
-          <a:lstStyle/>
-          <a:p>
-            <a:endParaRPr lang="en-US"/>
-          </a:p>
-        </p:txBody>
-      </p:sp>
+        </p:nvPicPr>
+        <p:blipFill rotWithShape="1">
+          <a:blip r:embed="rId2" cstate="print">
+            <a:extLst>
+              <a:ext uri="{28A0092B-C50C-407E-A947-70E740481C1C}">
+                <a14:useLocalDpi xmlns:a14="http://schemas.microsoft.com/office/drawing/2010/main" val="0"/>
+              </a:ext>
+            </a:extLst>
+          </a:blip>
+          <a:srcRect r="1377"/>
+          <a:stretch/>
+        </p:blipFill>
+        <p:spPr>
+          <a:xfrm>
+            <a:off x="2498019" y="2120900"/>
+            <a:ext cx="7103181" cy="4051300"/>
+          </a:xfrm>
+          <a:prstGeom prst="rect">
+            <a:avLst/>
+          </a:prstGeom>
+          <a:ln>
+            <a:noFill/>
+          </a:ln>
+          <a:effectLst>
+            <a:outerShdw blurRad="292100" dist="139700" dir="2700000" algn="tl" rotWithShape="0">
+              <a:srgbClr val="333333">
+                <a:alpha val="65000"/>
+              </a:srgbClr>
+            </a:outerShdw>
+          </a:effectLst>
+        </p:spPr>
+      </p:pic>
     </p:spTree>
     <p:extLst>
       <p:ext uri="{BB962C8B-B14F-4D97-AF65-F5344CB8AC3E}">
@@ -4714,6 +4805,107 @@
 </file>
 
 <file path=ppt/slides/slide7.xml><?xml version="1.0" encoding="utf-8"?>
+<p:sld xmlns:a="http://schemas.openxmlformats.org/drawingml/2006/main" xmlns:r="http://schemas.openxmlformats.org/officeDocument/2006/relationships" xmlns:p="http://schemas.openxmlformats.org/presentationml/2006/main">
+  <p:cSld>
+    <p:spTree>
+      <p:nvGrpSpPr>
+        <p:cNvPr id="1" name=""/>
+        <p:cNvGrpSpPr/>
+        <p:nvPr/>
+      </p:nvGrpSpPr>
+      <p:grpSpPr>
+        <a:xfrm>
+          <a:off x="0" y="0"/>
+          <a:ext cx="0" cy="0"/>
+          <a:chOff x="0" y="0"/>
+          <a:chExt cx="0" cy="0"/>
+        </a:xfrm>
+      </p:grpSpPr>
+      <p:sp>
+        <p:nvSpPr>
+          <p:cNvPr id="2" name="Title 1"/>
+          <p:cNvSpPr>
+            <a:spLocks noGrp="1"/>
+          </p:cNvSpPr>
+          <p:nvPr>
+            <p:ph type="title"/>
+          </p:nvPr>
+        </p:nvSpPr>
+        <p:spPr/>
+        <p:txBody>
+          <a:bodyPr/>
+          <a:lstStyle/>
+          <a:p>
+            <a:r>
+              <a:rPr lang="en-US" dirty="0" smtClean="0"/>
+              <a:t>Checking out</a:t>
+            </a:r>
+            <a:endParaRPr lang="en-US" dirty="0"/>
+          </a:p>
+        </p:txBody>
+      </p:sp>
+      <p:pic>
+        <p:nvPicPr>
+          <p:cNvPr id="4" name="Content Placeholder 3"/>
+          <p:cNvPicPr>
+            <a:picLocks noGrp="1" noChangeAspect="1"/>
+          </p:cNvPicPr>
+          <p:nvPr>
+            <p:ph idx="1"/>
+          </p:nvPr>
+        </p:nvPicPr>
+        <p:blipFill rotWithShape="1">
+          <a:blip r:embed="rId2" cstate="print">
+            <a:extLst>
+              <a:ext uri="{28A0092B-C50C-407E-A947-70E740481C1C}">
+                <a14:useLocalDpi xmlns:a14="http://schemas.microsoft.com/office/drawing/2010/main" val="0"/>
+              </a:ext>
+            </a:extLst>
+          </a:blip>
+          <a:srcRect r="1630"/>
+          <a:stretch/>
+        </p:blipFill>
+        <p:spPr>
+          <a:xfrm>
+            <a:off x="2498019" y="2120900"/>
+            <a:ext cx="7084893" cy="4051300"/>
+          </a:xfrm>
+          <a:prstGeom prst="rect">
+            <a:avLst/>
+          </a:prstGeom>
+          <a:ln>
+            <a:noFill/>
+          </a:ln>
+          <a:effectLst>
+            <a:outerShdw blurRad="292100" dist="139700" dir="2700000" algn="tl" rotWithShape="0">
+              <a:srgbClr val="333333">
+                <a:alpha val="65000"/>
+              </a:srgbClr>
+            </a:outerShdw>
+          </a:effectLst>
+        </p:spPr>
+      </p:pic>
+    </p:spTree>
+    <p:extLst>
+      <p:ext uri="{BB962C8B-B14F-4D97-AF65-F5344CB8AC3E}">
+        <p14:creationId xmlns:p14="http://schemas.microsoft.com/office/powerpoint/2010/main" val="3675845098"/>
+      </p:ext>
+    </p:extLst>
+  </p:cSld>
+  <p:clrMapOvr>
+    <a:masterClrMapping/>
+  </p:clrMapOvr>
+  <p:timing>
+    <p:tnLst>
+      <p:par>
+        <p:cTn id="1" dur="indefinite" restart="never" nodeType="tmRoot"/>
+      </p:par>
+    </p:tnLst>
+  </p:timing>
+</p:sld>
+</file>
+
+<file path=ppt/slides/slide8.xml><?xml version="1.0" encoding="utf-8"?>
 <p:sld xmlns:a="http://schemas.openxmlformats.org/drawingml/2006/main" xmlns:r="http://schemas.openxmlformats.org/officeDocument/2006/relationships" xmlns:p="http://schemas.openxmlformats.org/presentationml/2006/main">
   <p:cSld>
     <p:spTree>
@@ -5132,11 +5324,6 @@
                         </a:rPr>
                         <a:t>Serve-Favicon</a:t>
                       </a:r>
-                      <a:endParaRPr lang="en-US" sz="2100" b="0" dirty="0" smtClean="0">
-                        <a:solidFill>
-                          <a:schemeClr val="tx1"/>
-                        </a:solidFill>
-                      </a:endParaRPr>
                     </a:p>
                   </a:txBody>
                   <a:tcPr>
@@ -5281,7 +5468,7 @@
 </p:sld>
 </file>
 
-<file path=ppt/slides/slide8.xml><?xml version="1.0" encoding="utf-8"?>
+<file path=ppt/slides/slide9.xml><?xml version="1.0" encoding="utf-8"?>
 <p:sld xmlns:a="http://schemas.openxmlformats.org/drawingml/2006/main" xmlns:r="http://schemas.openxmlformats.org/officeDocument/2006/relationships" xmlns:p="http://schemas.openxmlformats.org/presentationml/2006/main">
   <p:cSld>
     <p:spTree>
@@ -5333,13 +5520,28 @@
         </p:nvSpPr>
         <p:spPr/>
         <p:txBody>
-          <a:bodyPr/>
+          <a:bodyPr>
+            <a:normAutofit/>
+          </a:bodyPr>
           <a:lstStyle/>
           <a:p>
             <a:r>
               <a:rPr lang="en-US" dirty="0" smtClean="0"/>
-              <a:t>SMS integration for waiting and receipt delivery</a:t>
-            </a:r>
+              <a:t>SMS </a:t>
+            </a:r>
+            <a:r>
+              <a:rPr lang="en-US" dirty="0" smtClean="0"/>
+              <a:t>alert integration </a:t>
+            </a:r>
+            <a:r>
+              <a:rPr lang="en-US" dirty="0" smtClean="0"/>
+              <a:t>for waiting and receipt </a:t>
+            </a:r>
+            <a:r>
+              <a:rPr lang="en-US" dirty="0" smtClean="0"/>
+              <a:t>delivery.</a:t>
+            </a:r>
+            <a:endParaRPr lang="en-US" dirty="0" smtClean="0"/>
           </a:p>
           <a:p>
             <a:endParaRPr lang="en-US" dirty="0" smtClean="0"/>
@@ -5355,8 +5557,9 @@
             </a:r>
             <a:r>
               <a:rPr lang="en-US" dirty="0" smtClean="0"/>
-              <a:t>integration</a:t>
-            </a:r>
+              <a:t>integration.</a:t>
+            </a:r>
+            <a:endParaRPr lang="en-US" dirty="0" smtClean="0"/>
           </a:p>
           <a:p>
             <a:endParaRPr lang="en-US" dirty="0"/>
@@ -5364,7 +5567,7 @@
           <a:p>
             <a:r>
               <a:rPr lang="en-US" dirty="0" smtClean="0"/>
-              <a:t>Administrative menu </a:t>
+              <a:t>Administrative interface </a:t>
             </a:r>
             <a:r>
               <a:rPr lang="en-US" dirty="0"/>
@@ -5372,8 +5575,9 @@
             </a:r>
             <a:r>
               <a:rPr lang="en-US" dirty="0" smtClean="0"/>
-              <a:t>employees</a:t>
-            </a:r>
+              <a:t>employees.</a:t>
+            </a:r>
+            <a:endParaRPr lang="en-US" dirty="0" smtClean="0"/>
           </a:p>
           <a:p>
             <a:endParaRPr lang="en-US" dirty="0"/>
@@ -5385,8 +5589,30 @@
             </a:r>
             <a:r>
               <a:rPr lang="en-US" dirty="0"/>
-              <a:t>tableside ordering system</a:t>
-            </a:r>
+              <a:t>tableside ordering </a:t>
+            </a:r>
+            <a:r>
+              <a:rPr lang="en-US" dirty="0" smtClean="0"/>
+              <a:t>system.</a:t>
+            </a:r>
+          </a:p>
+          <a:p>
+            <a:endParaRPr lang="en-US" dirty="0" smtClean="0"/>
+          </a:p>
+          <a:p>
+            <a:r>
+              <a:rPr lang="en-US" dirty="0" smtClean="0"/>
+              <a:t>Form </a:t>
+            </a:r>
+            <a:r>
+              <a:rPr lang="en-US" dirty="0"/>
+              <a:t>and data </a:t>
+            </a:r>
+            <a:r>
+              <a:rPr lang="en-US" dirty="0" smtClean="0"/>
+              <a:t>validation. </a:t>
+            </a:r>
+            <a:endParaRPr lang="en-US" dirty="0"/>
           </a:p>
         </p:txBody>
       </p:sp>
@@ -5412,7 +5638,7 @@
         </p:blipFill>
         <p:spPr>
           <a:xfrm>
-            <a:off x="7333673" y="1506745"/>
+            <a:off x="7790873" y="1488457"/>
             <a:ext cx="876300" cy="876300"/>
           </a:xfrm>
           <a:prstGeom prst="roundRect">
@@ -5497,7 +5723,7 @@
         </p:blipFill>
         <p:spPr>
           <a:xfrm>
-            <a:off x="8765309" y="3124325"/>
+            <a:off x="9103637" y="3124325"/>
             <a:ext cx="1106055" cy="1106055"/>
           </a:xfrm>
           <a:prstGeom prst="roundRect">
@@ -5540,8 +5766,51 @@
         </p:blipFill>
         <p:spPr>
           <a:xfrm>
-            <a:off x="5465075" y="4362286"/>
+            <a:off x="5792965" y="4342226"/>
             <a:ext cx="1101980" cy="1006475"/>
+          </a:xfrm>
+          <a:prstGeom prst="roundRect">
+            <a:avLst>
+              <a:gd name="adj" fmla="val 8594"/>
+            </a:avLst>
+          </a:prstGeom>
+          <a:solidFill>
+            <a:srgbClr val="FFFFFF">
+              <a:shade val="85000"/>
+            </a:srgbClr>
+          </a:solidFill>
+          <a:ln>
+            <a:noFill/>
+          </a:ln>
+          <a:effectLst>
+            <a:reflection blurRad="12700" stA="38000" endPos="28000" dist="5000" dir="5400000" sy="-100000" algn="bl" rotWithShape="0"/>
+          </a:effectLst>
+        </p:spPr>
+      </p:pic>
+      <p:pic>
+        <p:nvPicPr>
+          <p:cNvPr id="5" name="Picture 4"/>
+          <p:cNvPicPr>
+            <a:picLocks noChangeAspect="1"/>
+          </p:cNvPicPr>
+          <p:nvPr/>
+        </p:nvPicPr>
+        <p:blipFill>
+          <a:blip r:embed="rId6" cstate="print">
+            <a:extLst>
+              <a:ext uri="{28A0092B-C50C-407E-A947-70E740481C1C}">
+                <a14:useLocalDpi xmlns:a14="http://schemas.microsoft.com/office/drawing/2010/main" val="0"/>
+              </a:ext>
+            </a:extLst>
+          </a:blip>
+          <a:stretch>
+            <a:fillRect/>
+          </a:stretch>
+        </p:blipFill>
+        <p:spPr>
+          <a:xfrm>
+            <a:off x="4417018" y="5212032"/>
+            <a:ext cx="856033" cy="896160"/>
           </a:xfrm>
           <a:prstGeom prst="roundRect">
             <a:avLst>

</xml_diff>